<commit_message>
Fixed some issues with my Prototype
Added gender of tutor in Tutor-Search and Fixed a Menu bug.
</commit_message>
<xml_diff>
--- a/Prototypes/Power Point Prototype/Einzeln/Login.pptx
+++ b/Prototypes/Power Point Prototype/Einzeln/Login.pptx
@@ -10352,7 +10352,9 @@
       </p:sp>
       <p:sp>
         <p:nvSpPr>
-          <p:cNvPr id="7" name="Rectangle à coins arrondis 6"/>
+          <p:cNvPr id="7" name="Rectangle à coins arrondis 6">
+            <a:hlinkClick r:id="rId3" action="ppaction://hlinkpres?slideindex=1&amp;slidetitle="/>
+          </p:cNvPr>
           <p:cNvSpPr/>
           <p:nvPr/>
         </p:nvSpPr>
@@ -10439,7 +10441,7 @@
       <p:sp>
         <p:nvSpPr>
           <p:cNvPr id="13" name="ZoneTexte 12">
-            <a:hlinkClick r:id="rId3" action="ppaction://hlinkpres?slideindex=1&amp;slidetitle="/>
+            <a:hlinkClick r:id="rId4" action="ppaction://hlinkpres?slideindex=1&amp;slidetitle="/>
           </p:cNvPr>
           <p:cNvSpPr txBox="1"/>
           <p:nvPr/>

</xml_diff>